<commit_message>
New presentations and minor HTML updates
</commit_message>
<xml_diff>
--- a/docs/presentations/vine-workshop/vine-workshop.pptx
+++ b/docs/presentations/vine-workshop/vine-workshop.pptx
@@ -5,7 +5,7 @@
     <p:sldMasterId id="2147483713" r:id="rId1"/>
   </p:sldMasterIdLst>
   <p:notesMasterIdLst>
-    <p:notesMasterId r:id="rId27"/>
+    <p:notesMasterId r:id="rId21"/>
   </p:notesMasterIdLst>
   <p:sldIdLst>
     <p:sldId id="256" r:id="rId2"/>
@@ -26,13 +26,7 @@
     <p:sldId id="318" r:id="rId17"/>
     <p:sldId id="319" r:id="rId18"/>
     <p:sldId id="321" r:id="rId19"/>
-    <p:sldId id="298" r:id="rId20"/>
-    <p:sldId id="307" r:id="rId21"/>
-    <p:sldId id="290" r:id="rId22"/>
-    <p:sldId id="295" r:id="rId23"/>
-    <p:sldId id="296" r:id="rId24"/>
-    <p:sldId id="257" r:id="rId25"/>
-    <p:sldId id="284" r:id="rId26"/>
+    <p:sldId id="284" r:id="rId20"/>
   </p:sldIdLst>
   <p:sldSz cx="12192000" cy="6858000"/>
   <p:notesSz cx="6858000" cy="9144000"/>
@@ -232,7 +226,7 @@
           <a:p>
             <a:fld id="{2FDDA3EC-3C5A-4E95-A2CE-1E694CF43D73}" type="datetimeFigureOut">
               <a:rPr lang="en-GB" smtClean="0"/>
-              <a:t>25/03/2019</a:t>
+              <a:t>15/06/2020</a:t>
             </a:fld>
             <a:endParaRPr lang="en-GB"/>
           </a:p>
@@ -1858,98 +1852,6 @@
 </p:notes>
 </file>
 
-<file path=ppt/notesSlides/notesSlide18.xml><?xml version="1.0" encoding="utf-8"?>
-<p:notes xmlns:a="http://schemas.openxmlformats.org/drawingml/2006/main" xmlns:r="http://schemas.openxmlformats.org/officeDocument/2006/relationships" xmlns:p="http://schemas.openxmlformats.org/presentationml/2006/main">
-  <p:cSld>
-    <p:spTree>
-      <p:nvGrpSpPr>
-        <p:cNvPr id="1" name=""/>
-        <p:cNvGrpSpPr/>
-        <p:nvPr/>
-      </p:nvGrpSpPr>
-      <p:grpSpPr>
-        <a:xfrm>
-          <a:off x="0" y="0"/>
-          <a:ext cx="0" cy="0"/>
-          <a:chOff x="0" y="0"/>
-          <a:chExt cx="0" cy="0"/>
-        </a:xfrm>
-      </p:grpSpPr>
-      <p:sp>
-        <p:nvSpPr>
-          <p:cNvPr id="2" name="Slide Image Placeholder 1"/>
-          <p:cNvSpPr>
-            <a:spLocks noGrp="1" noRot="1" noChangeAspect="1"/>
-          </p:cNvSpPr>
-          <p:nvPr>
-            <p:ph type="sldImg"/>
-          </p:nvPr>
-        </p:nvSpPr>
-        <p:spPr/>
-      </p:sp>
-      <p:sp>
-        <p:nvSpPr>
-          <p:cNvPr id="3" name="Notes Placeholder 2"/>
-          <p:cNvSpPr>
-            <a:spLocks noGrp="1"/>
-          </p:cNvSpPr>
-          <p:nvPr>
-            <p:ph type="body" idx="1"/>
-          </p:nvPr>
-        </p:nvSpPr>
-        <p:spPr/>
-        <p:txBody>
-          <a:bodyPr/>
-          <a:lstStyle/>
-          <a:p>
-            <a:r>
-              <a:rPr lang="en-US" dirty="0"/>
-              <a:t>https://hscic365.sharepoint.com/sites/Corporate%20image%20library/Icons/Forms/</a:t>
-            </a:r>
-            <a:r>
-              <a:rPr lang="en-US" dirty="0" err="1"/>
-              <a:t>Thumbnails.aspx</a:t>
-            </a:r>
-            <a:endParaRPr lang="en-US" dirty="0"/>
-          </a:p>
-        </p:txBody>
-      </p:sp>
-      <p:sp>
-        <p:nvSpPr>
-          <p:cNvPr id="4" name="Slide Number Placeholder 3"/>
-          <p:cNvSpPr>
-            <a:spLocks noGrp="1"/>
-          </p:cNvSpPr>
-          <p:nvPr>
-            <p:ph type="sldNum" sz="quarter" idx="5"/>
-          </p:nvPr>
-        </p:nvSpPr>
-        <p:spPr/>
-        <p:txBody>
-          <a:bodyPr/>
-          <a:lstStyle/>
-          <a:p>
-            <a:fld id="{4F0A2CAB-BB30-4D6F-9F28-78DA1CD59242}" type="slidenum">
-              <a:rPr lang="en-GB" smtClean="0"/>
-              <a:t>23</a:t>
-            </a:fld>
-            <a:endParaRPr lang="en-GB"/>
-          </a:p>
-        </p:txBody>
-      </p:sp>
-    </p:spTree>
-    <p:extLst>
-      <p:ext uri="{BB962C8B-B14F-4D97-AF65-F5344CB8AC3E}">
-        <p14:creationId xmlns:p14="http://schemas.microsoft.com/office/powerpoint/2010/main" val="1790055455"/>
-      </p:ext>
-    </p:extLst>
-  </p:cSld>
-  <p:clrMapOvr>
-    <a:masterClrMapping/>
-  </p:clrMapOvr>
-</p:notes>
-</file>
-
 <file path=ppt/notesSlides/notesSlide2.xml><?xml version="1.0" encoding="utf-8"?>
 <p:notes xmlns:a="http://schemas.openxmlformats.org/drawingml/2006/main" xmlns:r="http://schemas.openxmlformats.org/officeDocument/2006/relationships" xmlns:p="http://schemas.openxmlformats.org/presentationml/2006/main">
   <p:cSld>
@@ -2885,7 +2787,7 @@
           <a:p>
             <a:fld id="{1F17544B-A8F1-446D-92CB-F32F893F4810}" type="datetime1">
               <a:rPr lang="en-GB" smtClean="0"/>
-              <a:t>25/03/2019</a:t>
+              <a:t>15/06/2020</a:t>
             </a:fld>
             <a:endParaRPr lang="en-GB"/>
           </a:p>
@@ -4377,7 +4279,7 @@
           <a:p>
             <a:fld id="{F9F2C434-3C98-4193-8DE0-87A308E0B760}" type="datetime1">
               <a:rPr lang="en-GB" smtClean="0"/>
-              <a:t>25/03/2019</a:t>
+              <a:t>15/06/2020</a:t>
             </a:fld>
             <a:endParaRPr lang="en-GB"/>
           </a:p>
@@ -5049,7 +4951,7 @@
           <a:p>
             <a:fld id="{F9F2C434-3C98-4193-8DE0-87A308E0B760}" type="datetime1">
               <a:rPr lang="en-GB" smtClean="0"/>
-              <a:t>25/03/2019</a:t>
+              <a:t>15/06/2020</a:t>
             </a:fld>
             <a:endParaRPr lang="en-GB"/>
           </a:p>
@@ -6004,7 +5906,7 @@
           <a:p>
             <a:fld id="{F9F2C434-3C98-4193-8DE0-87A308E0B760}" type="datetime1">
               <a:rPr lang="en-GB" smtClean="0"/>
-              <a:t>25/03/2019</a:t>
+              <a:t>15/06/2020</a:t>
             </a:fld>
             <a:endParaRPr lang="en-GB"/>
           </a:p>
@@ -7219,7 +7121,7 @@
           <a:p>
             <a:fld id="{40E1EFE2-B4BD-4554-9890-8C6DEFCB3AE2}" type="datetime1">
               <a:rPr lang="en-GB" smtClean="0"/>
-              <a:t>25/03/2019</a:t>
+              <a:t>15/06/2020</a:t>
             </a:fld>
             <a:endParaRPr lang="en-GB"/>
           </a:p>
@@ -9006,280 +8908,6 @@
 </file>
 
 <file path=ppt/slideLayouts/slideLayout14.xml><?xml version="1.0" encoding="utf-8"?>
-<p:sldLayout xmlns:a="http://schemas.openxmlformats.org/drawingml/2006/main" xmlns:r="http://schemas.openxmlformats.org/officeDocument/2006/relationships" xmlns:p="http://schemas.openxmlformats.org/presentationml/2006/main" showMasterSp="0" userDrawn="1">
-  <p:cSld name="Section Break (Image)">
-    <p:spTree>
-      <p:nvGrpSpPr>
-        <p:cNvPr id="1" name=""/>
-        <p:cNvGrpSpPr/>
-        <p:nvPr/>
-      </p:nvGrpSpPr>
-      <p:grpSpPr>
-        <a:xfrm>
-          <a:off x="0" y="0"/>
-          <a:ext cx="0" cy="0"/>
-          <a:chOff x="0" y="0"/>
-          <a:chExt cx="0" cy="0"/>
-        </a:xfrm>
-      </p:grpSpPr>
-      <p:sp>
-        <p:nvSpPr>
-          <p:cNvPr id="4" name="Date Placeholder 3"/>
-          <p:cNvSpPr>
-            <a:spLocks noGrp="1"/>
-          </p:cNvSpPr>
-          <p:nvPr>
-            <p:ph type="dt" sz="half" idx="10"/>
-          </p:nvPr>
-        </p:nvSpPr>
-        <p:spPr/>
-        <p:txBody>
-          <a:bodyPr/>
-          <a:lstStyle>
-            <a:lvl1pPr>
-              <a:defRPr>
-                <a:solidFill>
-                  <a:schemeClr val="bg1"/>
-                </a:solidFill>
-              </a:defRPr>
-            </a:lvl1pPr>
-          </a:lstStyle>
-          <a:p>
-            <a:fld id="{96EA3223-107E-45B1-8E17-635BA3AEFADA}" type="datetime1">
-              <a:rPr lang="en-GB" smtClean="0"/>
-              <a:pPr/>
-              <a:t>25/03/2019</a:t>
-            </a:fld>
-            <a:endParaRPr lang="en-GB"/>
-          </a:p>
-        </p:txBody>
-      </p:sp>
-      <p:sp>
-        <p:nvSpPr>
-          <p:cNvPr id="5" name="Footer Placeholder 4"/>
-          <p:cNvSpPr>
-            <a:spLocks noGrp="1"/>
-          </p:cNvSpPr>
-          <p:nvPr>
-            <p:ph type="ftr" sz="quarter" idx="11"/>
-          </p:nvPr>
-        </p:nvSpPr>
-        <p:spPr/>
-        <p:txBody>
-          <a:bodyPr/>
-          <a:lstStyle>
-            <a:lvl1pPr>
-              <a:defRPr>
-                <a:solidFill>
-                  <a:schemeClr val="bg1"/>
-                </a:solidFill>
-              </a:defRPr>
-            </a:lvl1pPr>
-          </a:lstStyle>
-          <a:p>
-            <a:endParaRPr lang="en-GB"/>
-          </a:p>
-        </p:txBody>
-      </p:sp>
-      <p:sp>
-        <p:nvSpPr>
-          <p:cNvPr id="6" name="Slide Number Placeholder 5"/>
-          <p:cNvSpPr>
-            <a:spLocks noGrp="1"/>
-          </p:cNvSpPr>
-          <p:nvPr>
-            <p:ph type="sldNum" sz="quarter" idx="12"/>
-          </p:nvPr>
-        </p:nvSpPr>
-        <p:spPr/>
-        <p:txBody>
-          <a:bodyPr/>
-          <a:lstStyle>
-            <a:lvl1pPr>
-              <a:defRPr>
-                <a:solidFill>
-                  <a:schemeClr val="bg1"/>
-                </a:solidFill>
-              </a:defRPr>
-            </a:lvl1pPr>
-          </a:lstStyle>
-          <a:p>
-            <a:fld id="{E6607247-EB78-480B-A962-35111A450531}" type="slidenum">
-              <a:rPr lang="en-GB" smtClean="0"/>
-              <a:pPr/>
-              <a:t>‹#›</a:t>
-            </a:fld>
-            <a:endParaRPr lang="en-GB"/>
-          </a:p>
-        </p:txBody>
-      </p:sp>
-      <p:sp>
-        <p:nvSpPr>
-          <p:cNvPr id="15" name="Picture Placeholder 14"/>
-          <p:cNvSpPr>
-            <a:spLocks noGrp="1"/>
-          </p:cNvSpPr>
-          <p:nvPr>
-            <p:ph type="pic" sz="quarter" idx="15" hasCustomPrompt="1"/>
-          </p:nvPr>
-        </p:nvSpPr>
-        <p:spPr>
-          <a:xfrm>
-            <a:off x="-2086" y="0"/>
-            <a:ext cx="12192000" cy="6858000"/>
-          </a:xfrm>
-          <a:blipFill>
-            <a:blip r:embed="rId2"/>
-            <a:stretch>
-              <a:fillRect/>
-            </a:stretch>
-          </a:blipFill>
-        </p:spPr>
-        <p:txBody>
-          <a:bodyPr tIns="288000">
-            <a:normAutofit/>
-          </a:bodyPr>
-          <a:lstStyle>
-            <a:lvl1pPr marL="177800" marR="0" indent="-177800" algn="l" defTabSz="914400" rtl="0" eaLnBrk="1" fontAlgn="auto" latinLnBrk="0" hangingPunct="1">
-              <a:lnSpc>
-                <a:spcPct val="100000"/>
-              </a:lnSpc>
-              <a:spcBef>
-                <a:spcPts val="1200"/>
-              </a:spcBef>
-              <a:spcAft>
-                <a:spcPts val="0"/>
-              </a:spcAft>
-              <a:buClr>
-                <a:schemeClr val="accent1"/>
-              </a:buClr>
-              <a:buSzTx/>
-              <a:buFont typeface="Arial" panose="020B0604020202020204" pitchFamily="34" charset="0"/>
-              <a:buChar char="•"/>
-              <a:tabLst/>
-              <a:defRPr sz="1800">
-                <a:solidFill>
-                  <a:schemeClr val="accent5"/>
-                </a:solidFill>
-                <a:highlight>
-                  <a:srgbClr val="FFFF00"/>
-                </a:highlight>
-              </a:defRPr>
-            </a:lvl1pPr>
-          </a:lstStyle>
-          <a:p>
-            <a:pPr marL="177800" marR="0" lvl="0" indent="-177800" algn="l" defTabSz="914400" rtl="0" eaLnBrk="1" fontAlgn="auto" latinLnBrk="0" hangingPunct="1">
-              <a:lnSpc>
-                <a:spcPct val="100000"/>
-              </a:lnSpc>
-              <a:spcBef>
-                <a:spcPts val="1200"/>
-              </a:spcBef>
-              <a:spcAft>
-                <a:spcPts val="0"/>
-              </a:spcAft>
-              <a:buClr>
-                <a:schemeClr val="accent1"/>
-              </a:buClr>
-              <a:buSzTx/>
-              <a:buFont typeface="Arial" panose="020B0604020202020204" pitchFamily="34" charset="0"/>
-              <a:buChar char="•"/>
-              <a:tabLst/>
-              <a:defRPr/>
-            </a:pPr>
-            <a:r>
-              <a:rPr lang="en-GB" dirty="0"/>
-              <a:t>Click image icon in centre to insert picture, then ‘right-click’ image and choose ‘Send to back'</a:t>
-            </a:r>
-          </a:p>
-        </p:txBody>
-      </p:sp>
-      <p:sp>
-        <p:nvSpPr>
-          <p:cNvPr id="13" name="Text Placeholder 12"/>
-          <p:cNvSpPr>
-            <a:spLocks noGrp="1"/>
-          </p:cNvSpPr>
-          <p:nvPr>
-            <p:ph type="body" sz="quarter" idx="14"/>
-          </p:nvPr>
-        </p:nvSpPr>
-        <p:spPr>
-          <a:xfrm>
-            <a:off x="0" y="2062800"/>
-            <a:ext cx="5143429" cy="2736000"/>
-          </a:xfrm>
-          <a:solidFill>
-            <a:schemeClr val="bg1">
-              <a:alpha val="82000"/>
-            </a:schemeClr>
-          </a:solidFill>
-        </p:spPr>
-        <p:txBody>
-          <a:bodyPr lIns="396000" anchor="ctr"/>
-          <a:lstStyle>
-            <a:lvl1pPr marL="0" indent="0">
-              <a:buNone/>
-              <a:defRPr sz="4000" b="1">
-                <a:solidFill>
-                  <a:schemeClr val="accent1"/>
-                </a:solidFill>
-              </a:defRPr>
-            </a:lvl1pPr>
-            <a:lvl2pPr marL="0" indent="0">
-              <a:spcBef>
-                <a:spcPts val="600"/>
-              </a:spcBef>
-              <a:buNone/>
-              <a:defRPr sz="2500" b="1">
-                <a:solidFill>
-                  <a:schemeClr val="tx2"/>
-                </a:solidFill>
-              </a:defRPr>
-            </a:lvl2pPr>
-          </a:lstStyle>
-          <a:p>
-            <a:pPr lvl="0"/>
-            <a:r>
-              <a:rPr lang="en-US"/>
-              <a:t>Edit Master text styles</a:t>
-            </a:r>
-          </a:p>
-          <a:p>
-            <a:pPr lvl="1"/>
-            <a:r>
-              <a:rPr lang="en-US"/>
-              <a:t>Second level</a:t>
-            </a:r>
-          </a:p>
-        </p:txBody>
-      </p:sp>
-    </p:spTree>
-    <p:extLst>
-      <p:ext uri="{BB962C8B-B14F-4D97-AF65-F5344CB8AC3E}">
-        <p14:creationId xmlns:p14="http://schemas.microsoft.com/office/powerpoint/2010/main" val="3493297571"/>
-      </p:ext>
-    </p:extLst>
-  </p:cSld>
-  <p:clrMapOvr>
-    <a:masterClrMapping/>
-  </p:clrMapOvr>
-  <mc:AlternateContent xmlns:mc="http://schemas.openxmlformats.org/markup-compatibility/2006" xmlns:p14="http://schemas.microsoft.com/office/powerpoint/2010/main">
-    <mc:Choice Requires="p14">
-      <p:transition spd="med" p14:dur="700">
-        <p:fade/>
-      </p:transition>
-    </mc:Choice>
-    <mc:Fallback xmlns="">
-      <p:transition spd="med">
-        <p:fade/>
-      </p:transition>
-    </mc:Fallback>
-  </mc:AlternateContent>
-</p:sldLayout>
-</file>
-
-<file path=ppt/slideLayouts/slideLayout15.xml><?xml version="1.0" encoding="utf-8"?>
 <p:sldLayout xmlns:a="http://schemas.openxmlformats.org/drawingml/2006/main" xmlns:r="http://schemas.openxmlformats.org/officeDocument/2006/relationships" xmlns:p="http://schemas.openxmlformats.org/presentationml/2006/main" showMasterSp="0" preserve="1" userDrawn="1">
   <p:cSld name="1_Title Slide">
     <p:spTree>
@@ -9418,7 +9046,7 @@
           <a:p>
             <a:fld id="{1F17544B-A8F1-446D-92CB-F32F893F4810}" type="datetime1">
               <a:rPr lang="en-GB" smtClean="0"/>
-              <a:t>25/03/2019</a:t>
+              <a:t>15/06/2020</a:t>
             </a:fld>
             <a:endParaRPr lang="en-GB"/>
           </a:p>
@@ -9640,7 +9268,7 @@
 </p:sldLayout>
 </file>
 
-<file path=ppt/slideLayouts/slideLayout16.xml><?xml version="1.0" encoding="utf-8"?>
+<file path=ppt/slideLayouts/slideLayout15.xml><?xml version="1.0" encoding="utf-8"?>
 <p:sldLayout xmlns:a="http://schemas.openxmlformats.org/drawingml/2006/main" xmlns:r="http://schemas.openxmlformats.org/officeDocument/2006/relationships" xmlns:p="http://schemas.openxmlformats.org/presentationml/2006/main" preserve="1" userDrawn="1">
   <p:cSld name="1_Quotation (White)">
     <p:spTree>
@@ -9733,7 +9361,7 @@
           <a:p>
             <a:fld id="{05E7B95C-A193-4CCF-A912-4D852A5A7231}" type="datetime1">
               <a:rPr lang="en-GB" smtClean="0"/>
-              <a:t>25/03/2019</a:t>
+              <a:t>15/06/2020</a:t>
             </a:fld>
             <a:endParaRPr lang="en-GB"/>
           </a:p>
@@ -9806,7 +9434,7 @@
 </p:sldLayout>
 </file>
 
-<file path=ppt/slideLayouts/slideLayout17.xml><?xml version="1.0" encoding="utf-8"?>
+<file path=ppt/slideLayouts/slideLayout16.xml><?xml version="1.0" encoding="utf-8"?>
 <p:sldLayout xmlns:a="http://schemas.openxmlformats.org/drawingml/2006/main" xmlns:r="http://schemas.openxmlformats.org/officeDocument/2006/relationships" xmlns:p="http://schemas.openxmlformats.org/presentationml/2006/main" showMasterSp="0" preserve="1" userDrawn="1">
   <p:cSld name="Quotation (Image)">
     <p:spTree>
@@ -9994,7 +9622,7 @@
             <a:fld id="{05E7B95C-A193-4CCF-A912-4D852A5A7231}" type="datetime1">
               <a:rPr lang="en-GB" smtClean="0"/>
               <a:pPr/>
-              <a:t>25/03/2019</a:t>
+              <a:t>15/06/2020</a:t>
             </a:fld>
             <a:endParaRPr lang="en-GB"/>
           </a:p>
@@ -10076,7 +9704,7 @@
 </p:sldLayout>
 </file>
 
-<file path=ppt/slideLayouts/slideLayout18.xml><?xml version="1.0" encoding="utf-8"?>
+<file path=ppt/slideLayouts/slideLayout17.xml><?xml version="1.0" encoding="utf-8"?>
 <p:sldLayout xmlns:a="http://schemas.openxmlformats.org/drawingml/2006/main" xmlns:r="http://schemas.openxmlformats.org/officeDocument/2006/relationships" xmlns:p="http://schemas.openxmlformats.org/presentationml/2006/main" showMasterSp="0" preserve="1" userDrawn="1">
   <p:cSld name="1_Quotation (Blue)">
     <p:bg>
@@ -10190,7 +9818,7 @@
             <a:fld id="{05E7B95C-A193-4CCF-A912-4D852A5A7231}" type="datetime1">
               <a:rPr lang="en-GB" smtClean="0"/>
               <a:pPr/>
-              <a:t>25/03/2019</a:t>
+              <a:t>15/06/2020</a:t>
             </a:fld>
             <a:endParaRPr lang="en-GB"/>
           </a:p>
@@ -10280,7 +9908,7 @@
 </p:sldLayout>
 </file>
 
-<file path=ppt/slideLayouts/slideLayout19.xml><?xml version="1.0" encoding="utf-8"?>
+<file path=ppt/slideLayouts/slideLayout18.xml><?xml version="1.0" encoding="utf-8"?>
 <p:sldLayout xmlns:a="http://schemas.openxmlformats.org/drawingml/2006/main" xmlns:r="http://schemas.openxmlformats.org/officeDocument/2006/relationships" xmlns:p="http://schemas.openxmlformats.org/presentationml/2006/main" preserve="1" userDrawn="1">
   <p:cSld name="1_Quotation (Blue) With Image">
     <p:bg>
@@ -10394,7 +10022,7 @@
             <a:fld id="{05E7B95C-A193-4CCF-A912-4D852A5A7231}" type="datetime1">
               <a:rPr lang="en-GB" smtClean="0"/>
               <a:pPr/>
-              <a:t>25/03/2019</a:t>
+              <a:t>15/06/2020</a:t>
             </a:fld>
             <a:endParaRPr lang="en-GB"/>
           </a:p>
@@ -10535,6 +10163,285 @@
     <p:extLst>
       <p:ext uri="{BB962C8B-B14F-4D97-AF65-F5344CB8AC3E}">
         <p14:creationId xmlns:p14="http://schemas.microsoft.com/office/powerpoint/2010/main" val="3645772197"/>
+      </p:ext>
+    </p:extLst>
+  </p:cSld>
+  <p:clrMapOvr>
+    <a:masterClrMapping/>
+  </p:clrMapOvr>
+  <mc:AlternateContent xmlns:mc="http://schemas.openxmlformats.org/markup-compatibility/2006" xmlns:p14="http://schemas.microsoft.com/office/powerpoint/2010/main">
+    <mc:Choice Requires="p14">
+      <p:transition spd="med" p14:dur="700">
+        <p:fade/>
+      </p:transition>
+    </mc:Choice>
+    <mc:Fallback xmlns="">
+      <p:transition spd="med">
+        <p:fade/>
+      </p:transition>
+    </mc:Fallback>
+  </mc:AlternateContent>
+</p:sldLayout>
+</file>
+
+<file path=ppt/slideLayouts/slideLayout19.xml><?xml version="1.0" encoding="utf-8"?>
+<p:sldLayout xmlns:a="http://schemas.openxmlformats.org/drawingml/2006/main" xmlns:r="http://schemas.openxmlformats.org/officeDocument/2006/relationships" xmlns:p="http://schemas.openxmlformats.org/presentationml/2006/main" showMasterSp="0" preserve="1" userDrawn="1">
+  <p:cSld name="1_Quotation (Full Image 2)">
+    <p:spTree>
+      <p:nvGrpSpPr>
+        <p:cNvPr id="1" name=""/>
+        <p:cNvGrpSpPr/>
+        <p:nvPr/>
+      </p:nvGrpSpPr>
+      <p:grpSpPr>
+        <a:xfrm>
+          <a:off x="0" y="0"/>
+          <a:ext cx="0" cy="0"/>
+          <a:chOff x="0" y="0"/>
+          <a:chExt cx="0" cy="0"/>
+        </a:xfrm>
+      </p:grpSpPr>
+      <p:sp>
+        <p:nvSpPr>
+          <p:cNvPr id="7" name="Picture Placeholder 6"/>
+          <p:cNvSpPr>
+            <a:spLocks noGrp="1"/>
+          </p:cNvSpPr>
+          <p:nvPr>
+            <p:ph type="pic" sz="quarter" idx="13" hasCustomPrompt="1"/>
+          </p:nvPr>
+        </p:nvSpPr>
+        <p:spPr>
+          <a:xfrm>
+            <a:off x="-2086" y="0"/>
+            <a:ext cx="12194086" cy="6858000"/>
+          </a:xfrm>
+          <a:blipFill>
+            <a:blip r:embed="rId2"/>
+            <a:stretch>
+              <a:fillRect/>
+            </a:stretch>
+          </a:blipFill>
+        </p:spPr>
+        <p:txBody>
+          <a:bodyPr lIns="612000" tIns="2520000">
+            <a:normAutofit/>
+          </a:bodyPr>
+          <a:lstStyle>
+            <a:lvl1pPr marL="177800" marR="0" indent="-177800" algn="l" defTabSz="914400" rtl="0" eaLnBrk="1" fontAlgn="auto" latinLnBrk="0" hangingPunct="1">
+              <a:lnSpc>
+                <a:spcPct val="100000"/>
+              </a:lnSpc>
+              <a:spcBef>
+                <a:spcPts val="1200"/>
+              </a:spcBef>
+              <a:spcAft>
+                <a:spcPts val="0"/>
+              </a:spcAft>
+              <a:buClr>
+                <a:schemeClr val="accent1"/>
+              </a:buClr>
+              <a:buSzTx/>
+              <a:buFont typeface="Arial" panose="020B0604020202020204" pitchFamily="34" charset="0"/>
+              <a:buChar char="•"/>
+              <a:tabLst/>
+              <a:defRPr sz="1600">
+                <a:solidFill>
+                  <a:schemeClr val="accent5"/>
+                </a:solidFill>
+                <a:highlight>
+                  <a:srgbClr val="FFFF00"/>
+                </a:highlight>
+              </a:defRPr>
+            </a:lvl1pPr>
+          </a:lstStyle>
+          <a:p>
+            <a:pPr marL="177800" marR="0" lvl="0" indent="-177800" algn="l" defTabSz="914400" rtl="0" eaLnBrk="1" fontAlgn="auto" latinLnBrk="0" hangingPunct="1">
+              <a:lnSpc>
+                <a:spcPct val="100000"/>
+              </a:lnSpc>
+              <a:spcBef>
+                <a:spcPts val="1200"/>
+              </a:spcBef>
+              <a:spcAft>
+                <a:spcPts val="0"/>
+              </a:spcAft>
+              <a:buClr>
+                <a:schemeClr val="accent1"/>
+              </a:buClr>
+              <a:buSzTx/>
+              <a:buFont typeface="Arial" panose="020B0604020202020204" pitchFamily="34" charset="0"/>
+              <a:buChar char="•"/>
+              <a:tabLst/>
+              <a:defRPr/>
+            </a:pPr>
+            <a:r>
+              <a:rPr lang="en-GB" dirty="0"/>
+              <a:t>Click image icon in centre to insert picture, </a:t>
+            </a:r>
+            <a:br>
+              <a:rPr lang="en-GB" dirty="0"/>
+            </a:br>
+            <a:r>
+              <a:rPr lang="en-GB" dirty="0"/>
+              <a:t>then ‘right-click’ image and choose ‘Send to back'</a:t>
+            </a:r>
+          </a:p>
+        </p:txBody>
+      </p:sp>
+      <p:sp>
+        <p:nvSpPr>
+          <p:cNvPr id="4" name="Date Placeholder 3"/>
+          <p:cNvSpPr>
+            <a:spLocks noGrp="1"/>
+          </p:cNvSpPr>
+          <p:nvPr>
+            <p:ph type="dt" sz="half" idx="10"/>
+          </p:nvPr>
+        </p:nvSpPr>
+        <p:spPr/>
+        <p:txBody>
+          <a:bodyPr/>
+          <a:lstStyle>
+            <a:lvl1pPr>
+              <a:defRPr>
+                <a:solidFill>
+                  <a:schemeClr val="accent1"/>
+                </a:solidFill>
+              </a:defRPr>
+            </a:lvl1pPr>
+          </a:lstStyle>
+          <a:p>
+            <a:fld id="{05E7B95C-A193-4CCF-A912-4D852A5A7231}" type="datetime1">
+              <a:rPr lang="en-GB" smtClean="0"/>
+              <a:pPr/>
+              <a:t>15/06/2020</a:t>
+            </a:fld>
+            <a:endParaRPr lang="en-GB"/>
+          </a:p>
+        </p:txBody>
+      </p:sp>
+      <p:sp>
+        <p:nvSpPr>
+          <p:cNvPr id="5" name="Footer Placeholder 4"/>
+          <p:cNvSpPr>
+            <a:spLocks noGrp="1"/>
+          </p:cNvSpPr>
+          <p:nvPr>
+            <p:ph type="ftr" sz="quarter" idx="11"/>
+          </p:nvPr>
+        </p:nvSpPr>
+        <p:spPr/>
+        <p:txBody>
+          <a:bodyPr/>
+          <a:lstStyle/>
+          <a:p>
+            <a:endParaRPr lang="en-GB"/>
+          </a:p>
+        </p:txBody>
+      </p:sp>
+      <p:sp>
+        <p:nvSpPr>
+          <p:cNvPr id="6" name="Slide Number Placeholder 5"/>
+          <p:cNvSpPr>
+            <a:spLocks noGrp="1"/>
+          </p:cNvSpPr>
+          <p:nvPr>
+            <p:ph type="sldNum" sz="quarter" idx="12"/>
+          </p:nvPr>
+        </p:nvSpPr>
+        <p:spPr/>
+        <p:txBody>
+          <a:bodyPr/>
+          <a:lstStyle>
+            <a:lvl1pPr>
+              <a:defRPr>
+                <a:solidFill>
+                  <a:schemeClr val="accent1"/>
+                </a:solidFill>
+              </a:defRPr>
+            </a:lvl1pPr>
+          </a:lstStyle>
+          <a:p>
+            <a:fld id="{E6607247-EB78-480B-A962-35111A450531}" type="slidenum">
+              <a:rPr lang="en-GB" smtClean="0"/>
+              <a:pPr/>
+              <a:t>‹#›</a:t>
+            </a:fld>
+            <a:endParaRPr lang="en-GB"/>
+          </a:p>
+        </p:txBody>
+      </p:sp>
+      <p:sp>
+        <p:nvSpPr>
+          <p:cNvPr id="9" name="Text Placeholder 12"/>
+          <p:cNvSpPr>
+            <a:spLocks noGrp="1"/>
+          </p:cNvSpPr>
+          <p:nvPr>
+            <p:ph type="body" sz="quarter" idx="14"/>
+          </p:nvPr>
+        </p:nvSpPr>
+        <p:spPr>
+          <a:xfrm>
+            <a:off x="6858000" y="1"/>
+            <a:ext cx="4267200" cy="5695950"/>
+          </a:xfrm>
+          <a:solidFill>
+            <a:schemeClr val="accent1">
+              <a:alpha val="82000"/>
+            </a:schemeClr>
+          </a:solidFill>
+        </p:spPr>
+        <p:txBody>
+          <a:bodyPr lIns="540000" tIns="1008000" rIns="540000" anchor="t"/>
+          <a:lstStyle>
+            <a:lvl1pPr marL="123825" indent="-123825">
+              <a:spcBef>
+                <a:spcPts val="0"/>
+              </a:spcBef>
+              <a:spcAft>
+                <a:spcPts val="600"/>
+              </a:spcAft>
+              <a:buNone/>
+              <a:defRPr sz="2700" b="0">
+                <a:solidFill>
+                  <a:schemeClr val="bg1"/>
+                </a:solidFill>
+              </a:defRPr>
+            </a:lvl1pPr>
+            <a:lvl2pPr marL="123825" indent="0">
+              <a:spcBef>
+                <a:spcPts val="0"/>
+              </a:spcBef>
+              <a:buNone/>
+              <a:defRPr sz="2100" b="1">
+                <a:solidFill>
+                  <a:schemeClr val="accent6"/>
+                </a:solidFill>
+              </a:defRPr>
+            </a:lvl2pPr>
+          </a:lstStyle>
+          <a:p>
+            <a:pPr lvl="0"/>
+            <a:r>
+              <a:rPr lang="en-US"/>
+              <a:t>Edit Master text styles</a:t>
+            </a:r>
+          </a:p>
+          <a:p>
+            <a:pPr lvl="1"/>
+            <a:r>
+              <a:rPr lang="en-US"/>
+              <a:t>Second level</a:t>
+            </a:r>
+          </a:p>
+        </p:txBody>
+      </p:sp>
+    </p:spTree>
+    <p:extLst>
+      <p:ext uri="{BB962C8B-B14F-4D97-AF65-F5344CB8AC3E}">
+        <p14:creationId xmlns:p14="http://schemas.microsoft.com/office/powerpoint/2010/main" val="2085111419"/>
       </p:ext>
     </p:extLst>
   </p:cSld>
@@ -10683,7 +10590,7 @@
           <a:p>
             <a:fld id="{05E7B95C-A193-4CCF-A912-4D852A5A7231}" type="datetime1">
               <a:rPr lang="en-GB" smtClean="0"/>
-              <a:t>25/03/2019</a:t>
+              <a:t>15/06/2020</a:t>
             </a:fld>
             <a:endParaRPr lang="en-GB"/>
           </a:p>
@@ -10762,285 +10669,6 @@
 </file>
 
 <file path=ppt/slideLayouts/slideLayout20.xml><?xml version="1.0" encoding="utf-8"?>
-<p:sldLayout xmlns:a="http://schemas.openxmlformats.org/drawingml/2006/main" xmlns:r="http://schemas.openxmlformats.org/officeDocument/2006/relationships" xmlns:p="http://schemas.openxmlformats.org/presentationml/2006/main" showMasterSp="0" preserve="1" userDrawn="1">
-  <p:cSld name="1_Quotation (Full Image 2)">
-    <p:spTree>
-      <p:nvGrpSpPr>
-        <p:cNvPr id="1" name=""/>
-        <p:cNvGrpSpPr/>
-        <p:nvPr/>
-      </p:nvGrpSpPr>
-      <p:grpSpPr>
-        <a:xfrm>
-          <a:off x="0" y="0"/>
-          <a:ext cx="0" cy="0"/>
-          <a:chOff x="0" y="0"/>
-          <a:chExt cx="0" cy="0"/>
-        </a:xfrm>
-      </p:grpSpPr>
-      <p:sp>
-        <p:nvSpPr>
-          <p:cNvPr id="7" name="Picture Placeholder 6"/>
-          <p:cNvSpPr>
-            <a:spLocks noGrp="1"/>
-          </p:cNvSpPr>
-          <p:nvPr>
-            <p:ph type="pic" sz="quarter" idx="13" hasCustomPrompt="1"/>
-          </p:nvPr>
-        </p:nvSpPr>
-        <p:spPr>
-          <a:xfrm>
-            <a:off x="-2086" y="0"/>
-            <a:ext cx="12194086" cy="6858000"/>
-          </a:xfrm>
-          <a:blipFill>
-            <a:blip r:embed="rId2"/>
-            <a:stretch>
-              <a:fillRect/>
-            </a:stretch>
-          </a:blipFill>
-        </p:spPr>
-        <p:txBody>
-          <a:bodyPr lIns="612000" tIns="2520000">
-            <a:normAutofit/>
-          </a:bodyPr>
-          <a:lstStyle>
-            <a:lvl1pPr marL="177800" marR="0" indent="-177800" algn="l" defTabSz="914400" rtl="0" eaLnBrk="1" fontAlgn="auto" latinLnBrk="0" hangingPunct="1">
-              <a:lnSpc>
-                <a:spcPct val="100000"/>
-              </a:lnSpc>
-              <a:spcBef>
-                <a:spcPts val="1200"/>
-              </a:spcBef>
-              <a:spcAft>
-                <a:spcPts val="0"/>
-              </a:spcAft>
-              <a:buClr>
-                <a:schemeClr val="accent1"/>
-              </a:buClr>
-              <a:buSzTx/>
-              <a:buFont typeface="Arial" panose="020B0604020202020204" pitchFamily="34" charset="0"/>
-              <a:buChar char="•"/>
-              <a:tabLst/>
-              <a:defRPr sz="1600">
-                <a:solidFill>
-                  <a:schemeClr val="accent5"/>
-                </a:solidFill>
-                <a:highlight>
-                  <a:srgbClr val="FFFF00"/>
-                </a:highlight>
-              </a:defRPr>
-            </a:lvl1pPr>
-          </a:lstStyle>
-          <a:p>
-            <a:pPr marL="177800" marR="0" lvl="0" indent="-177800" algn="l" defTabSz="914400" rtl="0" eaLnBrk="1" fontAlgn="auto" latinLnBrk="0" hangingPunct="1">
-              <a:lnSpc>
-                <a:spcPct val="100000"/>
-              </a:lnSpc>
-              <a:spcBef>
-                <a:spcPts val="1200"/>
-              </a:spcBef>
-              <a:spcAft>
-                <a:spcPts val="0"/>
-              </a:spcAft>
-              <a:buClr>
-                <a:schemeClr val="accent1"/>
-              </a:buClr>
-              <a:buSzTx/>
-              <a:buFont typeface="Arial" panose="020B0604020202020204" pitchFamily="34" charset="0"/>
-              <a:buChar char="•"/>
-              <a:tabLst/>
-              <a:defRPr/>
-            </a:pPr>
-            <a:r>
-              <a:rPr lang="en-GB" dirty="0"/>
-              <a:t>Click image icon in centre to insert picture, </a:t>
-            </a:r>
-            <a:br>
-              <a:rPr lang="en-GB" dirty="0"/>
-            </a:br>
-            <a:r>
-              <a:rPr lang="en-GB" dirty="0"/>
-              <a:t>then ‘right-click’ image and choose ‘Send to back'</a:t>
-            </a:r>
-          </a:p>
-        </p:txBody>
-      </p:sp>
-      <p:sp>
-        <p:nvSpPr>
-          <p:cNvPr id="4" name="Date Placeholder 3"/>
-          <p:cNvSpPr>
-            <a:spLocks noGrp="1"/>
-          </p:cNvSpPr>
-          <p:nvPr>
-            <p:ph type="dt" sz="half" idx="10"/>
-          </p:nvPr>
-        </p:nvSpPr>
-        <p:spPr/>
-        <p:txBody>
-          <a:bodyPr/>
-          <a:lstStyle>
-            <a:lvl1pPr>
-              <a:defRPr>
-                <a:solidFill>
-                  <a:schemeClr val="accent1"/>
-                </a:solidFill>
-              </a:defRPr>
-            </a:lvl1pPr>
-          </a:lstStyle>
-          <a:p>
-            <a:fld id="{05E7B95C-A193-4CCF-A912-4D852A5A7231}" type="datetime1">
-              <a:rPr lang="en-GB" smtClean="0"/>
-              <a:pPr/>
-              <a:t>25/03/2019</a:t>
-            </a:fld>
-            <a:endParaRPr lang="en-GB"/>
-          </a:p>
-        </p:txBody>
-      </p:sp>
-      <p:sp>
-        <p:nvSpPr>
-          <p:cNvPr id="5" name="Footer Placeholder 4"/>
-          <p:cNvSpPr>
-            <a:spLocks noGrp="1"/>
-          </p:cNvSpPr>
-          <p:nvPr>
-            <p:ph type="ftr" sz="quarter" idx="11"/>
-          </p:nvPr>
-        </p:nvSpPr>
-        <p:spPr/>
-        <p:txBody>
-          <a:bodyPr/>
-          <a:lstStyle/>
-          <a:p>
-            <a:endParaRPr lang="en-GB"/>
-          </a:p>
-        </p:txBody>
-      </p:sp>
-      <p:sp>
-        <p:nvSpPr>
-          <p:cNvPr id="6" name="Slide Number Placeholder 5"/>
-          <p:cNvSpPr>
-            <a:spLocks noGrp="1"/>
-          </p:cNvSpPr>
-          <p:nvPr>
-            <p:ph type="sldNum" sz="quarter" idx="12"/>
-          </p:nvPr>
-        </p:nvSpPr>
-        <p:spPr/>
-        <p:txBody>
-          <a:bodyPr/>
-          <a:lstStyle>
-            <a:lvl1pPr>
-              <a:defRPr>
-                <a:solidFill>
-                  <a:schemeClr val="accent1"/>
-                </a:solidFill>
-              </a:defRPr>
-            </a:lvl1pPr>
-          </a:lstStyle>
-          <a:p>
-            <a:fld id="{E6607247-EB78-480B-A962-35111A450531}" type="slidenum">
-              <a:rPr lang="en-GB" smtClean="0"/>
-              <a:pPr/>
-              <a:t>‹#›</a:t>
-            </a:fld>
-            <a:endParaRPr lang="en-GB"/>
-          </a:p>
-        </p:txBody>
-      </p:sp>
-      <p:sp>
-        <p:nvSpPr>
-          <p:cNvPr id="9" name="Text Placeholder 12"/>
-          <p:cNvSpPr>
-            <a:spLocks noGrp="1"/>
-          </p:cNvSpPr>
-          <p:nvPr>
-            <p:ph type="body" sz="quarter" idx="14"/>
-          </p:nvPr>
-        </p:nvSpPr>
-        <p:spPr>
-          <a:xfrm>
-            <a:off x="6858000" y="1"/>
-            <a:ext cx="4267200" cy="5695950"/>
-          </a:xfrm>
-          <a:solidFill>
-            <a:schemeClr val="accent1">
-              <a:alpha val="82000"/>
-            </a:schemeClr>
-          </a:solidFill>
-        </p:spPr>
-        <p:txBody>
-          <a:bodyPr lIns="540000" tIns="1008000" rIns="540000" anchor="t"/>
-          <a:lstStyle>
-            <a:lvl1pPr marL="123825" indent="-123825">
-              <a:spcBef>
-                <a:spcPts val="0"/>
-              </a:spcBef>
-              <a:spcAft>
-                <a:spcPts val="600"/>
-              </a:spcAft>
-              <a:buNone/>
-              <a:defRPr sz="2700" b="0">
-                <a:solidFill>
-                  <a:schemeClr val="bg1"/>
-                </a:solidFill>
-              </a:defRPr>
-            </a:lvl1pPr>
-            <a:lvl2pPr marL="123825" indent="0">
-              <a:spcBef>
-                <a:spcPts val="0"/>
-              </a:spcBef>
-              <a:buNone/>
-              <a:defRPr sz="2100" b="1">
-                <a:solidFill>
-                  <a:schemeClr val="accent6"/>
-                </a:solidFill>
-              </a:defRPr>
-            </a:lvl2pPr>
-          </a:lstStyle>
-          <a:p>
-            <a:pPr lvl="0"/>
-            <a:r>
-              <a:rPr lang="en-US"/>
-              <a:t>Edit Master text styles</a:t>
-            </a:r>
-          </a:p>
-          <a:p>
-            <a:pPr lvl="1"/>
-            <a:r>
-              <a:rPr lang="en-US"/>
-              <a:t>Second level</a:t>
-            </a:r>
-          </a:p>
-        </p:txBody>
-      </p:sp>
-    </p:spTree>
-    <p:extLst>
-      <p:ext uri="{BB962C8B-B14F-4D97-AF65-F5344CB8AC3E}">
-        <p14:creationId xmlns:p14="http://schemas.microsoft.com/office/powerpoint/2010/main" val="2085111419"/>
-      </p:ext>
-    </p:extLst>
-  </p:cSld>
-  <p:clrMapOvr>
-    <a:masterClrMapping/>
-  </p:clrMapOvr>
-  <mc:AlternateContent xmlns:mc="http://schemas.openxmlformats.org/markup-compatibility/2006" xmlns:p14="http://schemas.microsoft.com/office/powerpoint/2010/main">
-    <mc:Choice Requires="p14">
-      <p:transition spd="med" p14:dur="700">
-        <p:fade/>
-      </p:transition>
-    </mc:Choice>
-    <mc:Fallback xmlns="">
-      <p:transition spd="med">
-        <p:fade/>
-      </p:transition>
-    </mc:Fallback>
-  </mc:AlternateContent>
-</p:sldLayout>
-</file>
-
-<file path=ppt/slideLayouts/slideLayout21.xml><?xml version="1.0" encoding="utf-8"?>
 <p:sldLayout xmlns:a="http://schemas.openxmlformats.org/drawingml/2006/main" xmlns:r="http://schemas.openxmlformats.org/officeDocument/2006/relationships" xmlns:p="http://schemas.openxmlformats.org/presentationml/2006/main" preserve="1" userDrawn="1">
   <p:cSld name="1_Icon Matrix 1">
     <p:spTree>
@@ -11097,7 +10725,7 @@
           <a:p>
             <a:fld id="{F9F2C434-3C98-4193-8DE0-87A308E0B760}" type="datetime1">
               <a:rPr lang="en-GB" smtClean="0"/>
-              <a:t>25/03/2019</a:t>
+              <a:t>15/06/2020</a:t>
             </a:fld>
             <a:endParaRPr lang="en-GB"/>
           </a:p>
@@ -11712,7 +11340,7 @@
 </p:sldLayout>
 </file>
 
-<file path=ppt/slideLayouts/slideLayout22.xml><?xml version="1.0" encoding="utf-8"?>
+<file path=ppt/slideLayouts/slideLayout21.xml><?xml version="1.0" encoding="utf-8"?>
 <p:sldLayout xmlns:a="http://schemas.openxmlformats.org/drawingml/2006/main" xmlns:r="http://schemas.openxmlformats.org/officeDocument/2006/relationships" xmlns:p="http://schemas.openxmlformats.org/presentationml/2006/main" preserve="1" userDrawn="1">
   <p:cSld name="1_Icon Matrix 2">
     <p:spTree>
@@ -11769,7 +11397,7 @@
           <a:p>
             <a:fld id="{F9F2C434-3C98-4193-8DE0-87A308E0B760}" type="datetime1">
               <a:rPr lang="en-GB" smtClean="0"/>
-              <a:t>25/03/2019</a:t>
+              <a:t>15/06/2020</a:t>
             </a:fld>
             <a:endParaRPr lang="en-GB"/>
           </a:p>
@@ -12667,7 +12295,7 @@
 </p:sldLayout>
 </file>
 
-<file path=ppt/slideLayouts/slideLayout23.xml><?xml version="1.0" encoding="utf-8"?>
+<file path=ppt/slideLayouts/slideLayout22.xml><?xml version="1.0" encoding="utf-8"?>
 <p:sldLayout xmlns:a="http://schemas.openxmlformats.org/drawingml/2006/main" xmlns:r="http://schemas.openxmlformats.org/officeDocument/2006/relationships" xmlns:p="http://schemas.openxmlformats.org/presentationml/2006/main" preserve="1" userDrawn="1">
   <p:cSld name="1_Icon Matrix 3">
     <p:spTree>
@@ -12724,7 +12352,7 @@
           <a:p>
             <a:fld id="{F9F2C434-3C98-4193-8DE0-87A308E0B760}" type="datetime1">
               <a:rPr lang="en-GB" smtClean="0"/>
-              <a:t>25/03/2019</a:t>
+              <a:t>15/06/2020</a:t>
             </a:fld>
             <a:endParaRPr lang="en-GB"/>
           </a:p>
@@ -13897,7 +13525,7 @@
 </p:sldLayout>
 </file>
 
-<file path=ppt/slideLayouts/slideLayout24.xml><?xml version="1.0" encoding="utf-8"?>
+<file path=ppt/slideLayouts/slideLayout23.xml><?xml version="1.0" encoding="utf-8"?>
 <p:sldLayout xmlns:a="http://schemas.openxmlformats.org/drawingml/2006/main" xmlns:r="http://schemas.openxmlformats.org/officeDocument/2006/relationships" xmlns:p="http://schemas.openxmlformats.org/presentationml/2006/main" showMasterSp="0" preserve="1" userDrawn="1">
   <p:cSld name="1_Contact">
     <p:bg>
@@ -13939,7 +13567,7 @@
           <a:p>
             <a:fld id="{40E1EFE2-B4BD-4554-9890-8C6DEFCB3AE2}" type="datetime1">
               <a:rPr lang="en-GB" smtClean="0"/>
-              <a:t>25/03/2019</a:t>
+              <a:t>15/06/2020</a:t>
             </a:fld>
             <a:endParaRPr lang="en-GB"/>
           </a:p>
@@ -15818,7 +15446,7 @@
           <a:p>
             <a:fld id="{05E7B95C-A193-4CCF-A912-4D852A5A7231}" type="datetime1">
               <a:rPr lang="en-GB" smtClean="0"/>
-              <a:t>25/03/2019</a:t>
+              <a:t>15/06/2020</a:t>
             </a:fld>
             <a:endParaRPr lang="en-GB"/>
           </a:p>
@@ -16005,7 +15633,7 @@
             <a:fld id="{05E7B95C-A193-4CCF-A912-4D852A5A7231}" type="datetime1">
               <a:rPr lang="en-GB" smtClean="0"/>
               <a:pPr/>
-              <a:t>25/03/2019</a:t>
+              <a:t>15/06/2020</a:t>
             </a:fld>
             <a:endParaRPr lang="en-GB"/>
           </a:p>
@@ -16209,7 +15837,7 @@
             <a:fld id="{05E7B95C-A193-4CCF-A912-4D852A5A7231}" type="datetime1">
               <a:rPr lang="en-GB" smtClean="0"/>
               <a:pPr/>
-              <a:t>25/03/2019</a:t>
+              <a:t>15/06/2020</a:t>
             </a:fld>
             <a:endParaRPr lang="en-GB"/>
           </a:p>
@@ -16514,7 +16142,7 @@
             <a:fld id="{05E7B95C-A193-4CCF-A912-4D852A5A7231}" type="datetime1">
               <a:rPr lang="en-GB" smtClean="0"/>
               <a:pPr/>
-              <a:t>25/03/2019</a:t>
+              <a:t>15/06/2020</a:t>
             </a:fld>
             <a:endParaRPr lang="en-GB"/>
           </a:p>
@@ -16776,7 +16404,7 @@
           <a:p>
             <a:fld id="{05E7B95C-A193-4CCF-A912-4D852A5A7231}" type="datetime1">
               <a:rPr lang="en-GB" smtClean="0"/>
-              <a:t>25/03/2019</a:t>
+              <a:t>15/06/2020</a:t>
             </a:fld>
             <a:endParaRPr lang="en-GB"/>
           </a:p>
@@ -17093,7 +16721,7 @@
           <a:p>
             <a:fld id="{96EA3223-107E-45B1-8E17-635BA3AEFADA}" type="datetime1">
               <a:rPr lang="en-GB" smtClean="0"/>
-              <a:t>25/03/2019</a:t>
+              <a:t>15/06/2020</a:t>
             </a:fld>
             <a:endParaRPr lang="en-GB"/>
           </a:p>
@@ -17374,7 +17002,7 @@
             <a:fld id="{96EA3223-107E-45B1-8E17-635BA3AEFADA}" type="datetime1">
               <a:rPr lang="en-GB" smtClean="0"/>
               <a:pPr/>
-              <a:t>25/03/2019</a:t>
+              <a:t>15/06/2020</a:t>
             </a:fld>
             <a:endParaRPr lang="en-GB"/>
           </a:p>
@@ -17614,7 +17242,7 @@
           <a:p>
             <a:fld id="{88BB7857-DBC9-4782-AAC6-5B3ABAF5DFB6}" type="datetime1">
               <a:rPr lang="en-GB" smtClean="0"/>
-              <a:t>25/03/2019</a:t>
+              <a:t>15/06/2020</a:t>
             </a:fld>
             <a:endParaRPr lang="en-GB" dirty="0"/>
           </a:p>
@@ -17717,17 +17345,16 @@
     <p:sldLayoutId id="2147483725" r:id="rId11"/>
     <p:sldLayoutId id="2147483726" r:id="rId12"/>
     <p:sldLayoutId id="2147483732" r:id="rId13"/>
-    <p:sldLayoutId id="2147483733" r:id="rId14"/>
-    <p:sldLayoutId id="2147483708" r:id="rId15"/>
-    <p:sldLayoutId id="2147483670" r:id="rId16"/>
-    <p:sldLayoutId id="2147483709" r:id="rId17"/>
-    <p:sldLayoutId id="2147483672" r:id="rId18"/>
-    <p:sldLayoutId id="2147483675" r:id="rId19"/>
-    <p:sldLayoutId id="2147483676" r:id="rId20"/>
-    <p:sldLayoutId id="2147483710" r:id="rId21"/>
-    <p:sldLayoutId id="2147483711" r:id="rId22"/>
-    <p:sldLayoutId id="2147483712" r:id="rId23"/>
-    <p:sldLayoutId id="2147483655" r:id="rId24"/>
+    <p:sldLayoutId id="2147483708" r:id="rId14"/>
+    <p:sldLayoutId id="2147483670" r:id="rId15"/>
+    <p:sldLayoutId id="2147483709" r:id="rId16"/>
+    <p:sldLayoutId id="2147483672" r:id="rId17"/>
+    <p:sldLayoutId id="2147483675" r:id="rId18"/>
+    <p:sldLayoutId id="2147483676" r:id="rId19"/>
+    <p:sldLayoutId id="2147483710" r:id="rId20"/>
+    <p:sldLayoutId id="2147483711" r:id="rId21"/>
+    <p:sldLayoutId id="2147483712" r:id="rId22"/>
+    <p:sldLayoutId id="2147483655" r:id="rId23"/>
   </p:sldLayoutIdLst>
   <mc:AlternateContent xmlns:mc="http://schemas.openxmlformats.org/markup-compatibility/2006" xmlns:p14="http://schemas.microsoft.com/office/powerpoint/2010/main">
     <mc:Choice Requires="p14">
@@ -19975,36 +19602,6 @@
       </p:grpSpPr>
       <p:sp>
         <p:nvSpPr>
-          <p:cNvPr id="9" name="Text Placeholder 8"/>
-          <p:cNvSpPr>
-            <a:spLocks noGrp="1"/>
-          </p:cNvSpPr>
-          <p:nvPr>
-            <p:ph idx="1"/>
-          </p:nvPr>
-        </p:nvSpPr>
-        <p:spPr/>
-        <p:txBody>
-          <a:bodyPr lIns="612000" rIns="180000"/>
-          <a:lstStyle/>
-          <a:p>
-            <a:endParaRPr lang="en-GB" dirty="0"/>
-          </a:p>
-          <a:p>
-            <a:pPr lvl="1"/>
-            <a:r>
-              <a:rPr lang="en-GB" b="1" dirty="0"/>
-              <a:t>Subheading here</a:t>
-            </a:r>
-            <a:br>
-              <a:rPr lang="en-GB" b="1" dirty="0"/>
-            </a:br>
-            <a:endParaRPr lang="en-GB" b="1" dirty="0"/>
-          </a:p>
-        </p:txBody>
-      </p:sp>
-      <p:sp>
-        <p:nvSpPr>
           <p:cNvPr id="4" name="Slide Number Placeholder 3"/>
           <p:cNvSpPr>
             <a:spLocks noGrp="1"/>
@@ -20018,78 +19615,18 @@
           <a:bodyPr/>
           <a:lstStyle/>
           <a:p>
-            <a:pPr marL="0" marR="0" lvl="0" indent="0" algn="r" defTabSz="914400" rtl="0" eaLnBrk="1" fontAlgn="auto" latinLnBrk="0" hangingPunct="1">
-              <a:lnSpc>
-                <a:spcPct val="100000"/>
-              </a:lnSpc>
-              <a:spcBef>
-                <a:spcPts val="0"/>
-              </a:spcBef>
-              <a:spcAft>
-                <a:spcPts val="0"/>
-              </a:spcAft>
-              <a:buClrTx/>
-              <a:buSzTx/>
-              <a:buFontTx/>
-              <a:buNone/>
-              <a:tabLst/>
-              <a:defRPr/>
-            </a:pPr>
             <a:fld id="{E6607247-EB78-480B-A962-35111A450531}" type="slidenum">
-              <a:rPr kumimoji="0" lang="en-GB" sz="1200" b="0" i="0" u="none" strike="noStrike" kern="1200" cap="none" spc="0" normalizeH="0" baseline="0" noProof="0" smtClean="0">
-                <a:ln>
-                  <a:noFill/>
-                </a:ln>
-                <a:solidFill>
-                  <a:prstClr val="white"/>
-                </a:solidFill>
-                <a:effectLst/>
-                <a:uLnTx/>
-                <a:uFillTx/>
-                <a:latin typeface="Arial"/>
-                <a:ea typeface="+mn-ea"/>
-                <a:cs typeface="+mn-cs"/>
-              </a:rPr>
-              <a:pPr marL="0" marR="0" lvl="0" indent="0" algn="r" defTabSz="914400" rtl="0" eaLnBrk="1" fontAlgn="auto" latinLnBrk="0" hangingPunct="1">
-                <a:lnSpc>
-                  <a:spcPct val="100000"/>
-                </a:lnSpc>
-                <a:spcBef>
-                  <a:spcPts val="0"/>
-                </a:spcBef>
-                <a:spcAft>
-                  <a:spcPts val="0"/>
-                </a:spcAft>
-                <a:buClrTx/>
-                <a:buSzTx/>
-                <a:buFontTx/>
-                <a:buNone/>
-                <a:tabLst/>
-                <a:defRPr/>
-              </a:pPr>
+              <a:rPr lang="en-GB" smtClean="0"/>
               <a:t>19</a:t>
             </a:fld>
-            <a:endParaRPr kumimoji="0" lang="en-GB" sz="1200" b="0" i="0" u="none" strike="noStrike" kern="1200" cap="none" spc="0" normalizeH="0" baseline="0" noProof="0">
-              <a:ln>
-                <a:noFill/>
-              </a:ln>
-              <a:solidFill>
-                <a:prstClr val="white"/>
-              </a:solidFill>
-              <a:effectLst/>
-              <a:uLnTx/>
-              <a:uFillTx/>
-              <a:latin typeface="Arial"/>
-              <a:ea typeface="+mn-ea"/>
-              <a:cs typeface="+mn-cs"/>
-            </a:endParaRPr>
+            <a:endParaRPr lang="en-GB"/>
           </a:p>
         </p:txBody>
       </p:sp>
     </p:spTree>
     <p:extLst>
       <p:ext uri="{BB962C8B-B14F-4D97-AF65-F5344CB8AC3E}">
-        <p14:creationId xmlns:p14="http://schemas.microsoft.com/office/powerpoint/2010/main" val="4128763108"/>
+        <p14:creationId xmlns:p14="http://schemas.microsoft.com/office/powerpoint/2010/main" val="3622467584"/>
       </p:ext>
     </p:extLst>
   </p:cSld>
@@ -20217,1010 +19754,6 @@
     <p:extLst>
       <p:ext uri="{BB962C8B-B14F-4D97-AF65-F5344CB8AC3E}">
         <p14:creationId xmlns:p14="http://schemas.microsoft.com/office/powerpoint/2010/main" val="3605987237"/>
-      </p:ext>
-    </p:extLst>
-  </p:cSld>
-  <p:clrMapOvr>
-    <a:masterClrMapping/>
-  </p:clrMapOvr>
-  <mc:AlternateContent xmlns:mc="http://schemas.openxmlformats.org/markup-compatibility/2006" xmlns:p14="http://schemas.microsoft.com/office/powerpoint/2010/main">
-    <mc:Choice Requires="p14">
-      <p:transition spd="med" p14:dur="700">
-        <p:fade/>
-      </p:transition>
-    </mc:Choice>
-    <mc:Fallback xmlns="">
-      <p:transition spd="med">
-        <p:fade/>
-      </p:transition>
-    </mc:Fallback>
-  </mc:AlternateContent>
-</p:sld>
-</file>
-
-<file path=ppt/slides/slide20.xml><?xml version="1.0" encoding="utf-8"?>
-<p:sld xmlns:a="http://schemas.openxmlformats.org/drawingml/2006/main" xmlns:r="http://schemas.openxmlformats.org/officeDocument/2006/relationships" xmlns:p="http://schemas.openxmlformats.org/presentationml/2006/main">
-  <p:cSld>
-    <p:spTree>
-      <p:nvGrpSpPr>
-        <p:cNvPr id="1" name=""/>
-        <p:cNvGrpSpPr/>
-        <p:nvPr/>
-      </p:nvGrpSpPr>
-      <p:grpSpPr>
-        <a:xfrm>
-          <a:off x="0" y="0"/>
-          <a:ext cx="0" cy="0"/>
-          <a:chOff x="0" y="0"/>
-          <a:chExt cx="0" cy="0"/>
-        </a:xfrm>
-      </p:grpSpPr>
-      <p:sp>
-        <p:nvSpPr>
-          <p:cNvPr id="2" name="Slide Number Placeholder 1">
-            <a:extLst>
-              <a:ext uri="{FF2B5EF4-FFF2-40B4-BE49-F238E27FC236}">
-                <a16:creationId xmlns:a16="http://schemas.microsoft.com/office/drawing/2014/main" id="{5D0E551C-0A64-9D4F-A18D-E9B5DE78B965}"/>
-              </a:ext>
-            </a:extLst>
-          </p:cNvPr>
-          <p:cNvSpPr>
-            <a:spLocks noGrp="1"/>
-          </p:cNvSpPr>
-          <p:nvPr>
-            <p:ph type="sldNum" sz="quarter" idx="12"/>
-          </p:nvPr>
-        </p:nvSpPr>
-        <p:spPr/>
-        <p:txBody>
-          <a:bodyPr/>
-          <a:lstStyle/>
-          <a:p>
-            <a:fld id="{E6607247-EB78-480B-A962-35111A450531}" type="slidenum">
-              <a:rPr lang="en-GB" smtClean="0"/>
-              <a:pPr/>
-              <a:t>20</a:t>
-            </a:fld>
-            <a:endParaRPr lang="en-GB"/>
-          </a:p>
-        </p:txBody>
-      </p:sp>
-      <p:sp>
-        <p:nvSpPr>
-          <p:cNvPr id="3" name="Picture Placeholder 2">
-            <a:extLst>
-              <a:ext uri="{FF2B5EF4-FFF2-40B4-BE49-F238E27FC236}">
-                <a16:creationId xmlns:a16="http://schemas.microsoft.com/office/drawing/2014/main" id="{38B697BC-2A82-C54C-943D-471CF4A2572F}"/>
-              </a:ext>
-            </a:extLst>
-          </p:cNvPr>
-          <p:cNvSpPr>
-            <a:spLocks noGrp="1"/>
-          </p:cNvSpPr>
-          <p:nvPr>
-            <p:ph type="pic" sz="quarter" idx="15"/>
-          </p:nvPr>
-        </p:nvSpPr>
-        <p:spPr/>
-      </p:sp>
-      <p:sp>
-        <p:nvSpPr>
-          <p:cNvPr id="4" name="Text Placeholder 3">
-            <a:extLst>
-              <a:ext uri="{FF2B5EF4-FFF2-40B4-BE49-F238E27FC236}">
-                <a16:creationId xmlns:a16="http://schemas.microsoft.com/office/drawing/2014/main" id="{9ABE3BDE-791C-4640-978A-8DC11667E892}"/>
-              </a:ext>
-            </a:extLst>
-          </p:cNvPr>
-          <p:cNvSpPr>
-            <a:spLocks noGrp="1"/>
-          </p:cNvSpPr>
-          <p:nvPr>
-            <p:ph type="body" sz="quarter" idx="14"/>
-          </p:nvPr>
-        </p:nvSpPr>
-        <p:spPr/>
-        <p:txBody>
-          <a:bodyPr/>
-          <a:lstStyle/>
-          <a:p>
-            <a:endParaRPr lang="en-US"/>
-          </a:p>
-        </p:txBody>
-      </p:sp>
-    </p:spTree>
-    <p:extLst>
-      <p:ext uri="{BB962C8B-B14F-4D97-AF65-F5344CB8AC3E}">
-        <p14:creationId xmlns:p14="http://schemas.microsoft.com/office/powerpoint/2010/main" val="3094477960"/>
-      </p:ext>
-    </p:extLst>
-  </p:cSld>
-  <p:clrMapOvr>
-    <a:masterClrMapping/>
-  </p:clrMapOvr>
-  <mc:AlternateContent xmlns:mc="http://schemas.openxmlformats.org/markup-compatibility/2006" xmlns:p14="http://schemas.microsoft.com/office/powerpoint/2010/main">
-    <mc:Choice Requires="p14">
-      <p:transition spd="med" p14:dur="700">
-        <p:fade/>
-      </p:transition>
-    </mc:Choice>
-    <mc:Fallback xmlns="">
-      <p:transition spd="med">
-        <p:fade/>
-      </p:transition>
-    </mc:Fallback>
-  </mc:AlternateContent>
-</p:sld>
-</file>
-
-<file path=ppt/slides/slide21.xml><?xml version="1.0" encoding="utf-8"?>
-<p:sld xmlns:a="http://schemas.openxmlformats.org/drawingml/2006/main" xmlns:r="http://schemas.openxmlformats.org/officeDocument/2006/relationships" xmlns:p="http://schemas.openxmlformats.org/presentationml/2006/main">
-  <p:cSld>
-    <p:spTree>
-      <p:nvGrpSpPr>
-        <p:cNvPr id="1" name=""/>
-        <p:cNvGrpSpPr/>
-        <p:nvPr/>
-      </p:nvGrpSpPr>
-      <p:grpSpPr>
-        <a:xfrm>
-          <a:off x="0" y="0"/>
-          <a:ext cx="0" cy="0"/>
-          <a:chOff x="0" y="0"/>
-          <a:chExt cx="0" cy="0"/>
-        </a:xfrm>
-      </p:grpSpPr>
-      <p:sp>
-        <p:nvSpPr>
-          <p:cNvPr id="5" name="Content Placeholder 4"/>
-          <p:cNvSpPr>
-            <a:spLocks noGrp="1"/>
-          </p:cNvSpPr>
-          <p:nvPr>
-            <p:ph idx="1"/>
-          </p:nvPr>
-        </p:nvSpPr>
-        <p:spPr>
-          <a:xfrm>
-            <a:off x="612000" y="1185864"/>
-            <a:ext cx="5288468" cy="5075236"/>
-          </a:xfrm>
-        </p:spPr>
-        <p:txBody>
-          <a:bodyPr/>
-          <a:lstStyle/>
-          <a:p>
-            <a:r>
-              <a:rPr lang="en-GB" dirty="0"/>
-              <a:t>“	Quotation text runs here. This is placeholder text, it is here to show how this slide will look when populated with real text.”</a:t>
-            </a:r>
-          </a:p>
-          <a:p>
-            <a:pPr lvl="1"/>
-            <a:r>
-              <a:rPr lang="en-GB" dirty="0"/>
-              <a:t>Name Surname</a:t>
-            </a:r>
-          </a:p>
-          <a:p>
-            <a:pPr lvl="1"/>
-            <a:r>
-              <a:rPr lang="en-GB" dirty="0"/>
-              <a:t>Job title</a:t>
-            </a:r>
-          </a:p>
-        </p:txBody>
-      </p:sp>
-      <p:sp>
-        <p:nvSpPr>
-          <p:cNvPr id="3" name="Slide Number Placeholder 2"/>
-          <p:cNvSpPr>
-            <a:spLocks noGrp="1"/>
-          </p:cNvSpPr>
-          <p:nvPr>
-            <p:ph type="sldNum" sz="quarter" idx="12"/>
-          </p:nvPr>
-        </p:nvSpPr>
-        <p:spPr/>
-        <p:txBody>
-          <a:bodyPr/>
-          <a:lstStyle/>
-          <a:p>
-            <a:pPr marL="0" marR="0" lvl="0" indent="0" algn="r" defTabSz="914400" rtl="0" eaLnBrk="1" fontAlgn="auto" latinLnBrk="0" hangingPunct="1">
-              <a:lnSpc>
-                <a:spcPct val="100000"/>
-              </a:lnSpc>
-              <a:spcBef>
-                <a:spcPts val="0"/>
-              </a:spcBef>
-              <a:spcAft>
-                <a:spcPts val="0"/>
-              </a:spcAft>
-              <a:buClrTx/>
-              <a:buSzTx/>
-              <a:buFontTx/>
-              <a:buNone/>
-              <a:tabLst/>
-              <a:defRPr/>
-            </a:pPr>
-            <a:fld id="{E6607247-EB78-480B-A962-35111A450531}" type="slidenum">
-              <a:rPr kumimoji="0" lang="en-GB" sz="1200" b="0" i="0" u="none" strike="noStrike" kern="1200" cap="none" spc="0" normalizeH="0" baseline="0" noProof="0" smtClean="0">
-                <a:ln>
-                  <a:noFill/>
-                </a:ln>
-                <a:solidFill>
-                  <a:prstClr val="white"/>
-                </a:solidFill>
-                <a:effectLst/>
-                <a:uLnTx/>
-                <a:uFillTx/>
-                <a:latin typeface="Arial"/>
-                <a:ea typeface="+mn-ea"/>
-                <a:cs typeface="+mn-cs"/>
-              </a:rPr>
-              <a:pPr marL="0" marR="0" lvl="0" indent="0" algn="r" defTabSz="914400" rtl="0" eaLnBrk="1" fontAlgn="auto" latinLnBrk="0" hangingPunct="1">
-                <a:lnSpc>
-                  <a:spcPct val="100000"/>
-                </a:lnSpc>
-                <a:spcBef>
-                  <a:spcPts val="0"/>
-                </a:spcBef>
-                <a:spcAft>
-                  <a:spcPts val="0"/>
-                </a:spcAft>
-                <a:buClrTx/>
-                <a:buSzTx/>
-                <a:buFontTx/>
-                <a:buNone/>
-                <a:tabLst/>
-                <a:defRPr/>
-              </a:pPr>
-              <a:t>21</a:t>
-            </a:fld>
-            <a:endParaRPr kumimoji="0" lang="en-GB" sz="1200" b="0" i="0" u="none" strike="noStrike" kern="1200" cap="none" spc="0" normalizeH="0" baseline="0" noProof="0">
-              <a:ln>
-                <a:noFill/>
-              </a:ln>
-              <a:solidFill>
-                <a:prstClr val="white"/>
-              </a:solidFill>
-              <a:effectLst/>
-              <a:uLnTx/>
-              <a:uFillTx/>
-              <a:latin typeface="Arial"/>
-              <a:ea typeface="+mn-ea"/>
-              <a:cs typeface="+mn-cs"/>
-            </a:endParaRPr>
-          </a:p>
-        </p:txBody>
-      </p:sp>
-      <p:sp>
-        <p:nvSpPr>
-          <p:cNvPr id="11" name="Picture Placeholder 10">
-            <a:extLst>
-              <a:ext uri="{FF2B5EF4-FFF2-40B4-BE49-F238E27FC236}">
-                <a16:creationId xmlns:a16="http://schemas.microsoft.com/office/drawing/2014/main" id="{FF696D2F-A565-4642-BD77-812CC4564F15}"/>
-              </a:ext>
-            </a:extLst>
-          </p:cNvPr>
-          <p:cNvSpPr>
-            <a:spLocks noGrp="1"/>
-          </p:cNvSpPr>
-          <p:nvPr>
-            <p:ph type="pic" sz="quarter" idx="13"/>
-          </p:nvPr>
-        </p:nvSpPr>
-        <p:spPr/>
-      </p:sp>
-    </p:spTree>
-    <p:extLst>
-      <p:ext uri="{BB962C8B-B14F-4D97-AF65-F5344CB8AC3E}">
-        <p14:creationId xmlns:p14="http://schemas.microsoft.com/office/powerpoint/2010/main" val="1551846234"/>
-      </p:ext>
-    </p:extLst>
-  </p:cSld>
-  <p:clrMapOvr>
-    <a:masterClrMapping/>
-  </p:clrMapOvr>
-  <mc:AlternateContent xmlns:mc="http://schemas.openxmlformats.org/markup-compatibility/2006" xmlns:p14="http://schemas.microsoft.com/office/powerpoint/2010/main">
-    <mc:Choice Requires="p14">
-      <p:transition spd="med" p14:dur="700">
-        <p:fade/>
-      </p:transition>
-    </mc:Choice>
-    <mc:Fallback xmlns="">
-      <p:transition spd="med">
-        <p:fade/>
-      </p:transition>
-    </mc:Fallback>
-  </mc:AlternateContent>
-</p:sld>
-</file>
-
-<file path=ppt/slides/slide22.xml><?xml version="1.0" encoding="utf-8"?>
-<p:sld xmlns:a="http://schemas.openxmlformats.org/drawingml/2006/main" xmlns:r="http://schemas.openxmlformats.org/officeDocument/2006/relationships" xmlns:p="http://schemas.openxmlformats.org/presentationml/2006/main">
-  <p:cSld>
-    <p:spTree>
-      <p:nvGrpSpPr>
-        <p:cNvPr id="1" name=""/>
-        <p:cNvGrpSpPr/>
-        <p:nvPr/>
-      </p:nvGrpSpPr>
-      <p:grpSpPr>
-        <a:xfrm>
-          <a:off x="0" y="0"/>
-          <a:ext cx="0" cy="0"/>
-          <a:chOff x="0" y="0"/>
-          <a:chExt cx="0" cy="0"/>
-        </a:xfrm>
-      </p:grpSpPr>
-      <p:sp>
-        <p:nvSpPr>
-          <p:cNvPr id="12" name="Picture Placeholder 11">
-            <a:extLst>
-              <a:ext uri="{FF2B5EF4-FFF2-40B4-BE49-F238E27FC236}">
-                <a16:creationId xmlns:a16="http://schemas.microsoft.com/office/drawing/2014/main" id="{2C9CCF3F-6C90-423F-9EB4-21A603CD5DC2}"/>
-              </a:ext>
-            </a:extLst>
-          </p:cNvPr>
-          <p:cNvSpPr>
-            <a:spLocks noGrp="1"/>
-          </p:cNvSpPr>
-          <p:nvPr>
-            <p:ph type="pic" sz="quarter" idx="13"/>
-          </p:nvPr>
-        </p:nvSpPr>
-        <p:spPr/>
-      </p:sp>
-      <p:sp>
-        <p:nvSpPr>
-          <p:cNvPr id="3" name="Slide Number Placeholder 2"/>
-          <p:cNvSpPr>
-            <a:spLocks noGrp="1"/>
-          </p:cNvSpPr>
-          <p:nvPr>
-            <p:ph type="sldNum" sz="quarter" idx="12"/>
-          </p:nvPr>
-        </p:nvSpPr>
-        <p:spPr/>
-        <p:txBody>
-          <a:bodyPr/>
-          <a:lstStyle/>
-          <a:p>
-            <a:pPr marL="0" marR="0" lvl="0" indent="0" algn="r" defTabSz="914400" rtl="0" eaLnBrk="1" fontAlgn="auto" latinLnBrk="0" hangingPunct="1">
-              <a:lnSpc>
-                <a:spcPct val="100000"/>
-              </a:lnSpc>
-              <a:spcBef>
-                <a:spcPts val="0"/>
-              </a:spcBef>
-              <a:spcAft>
-                <a:spcPts val="0"/>
-              </a:spcAft>
-              <a:buClrTx/>
-              <a:buSzTx/>
-              <a:buFontTx/>
-              <a:buNone/>
-              <a:tabLst/>
-              <a:defRPr/>
-            </a:pPr>
-            <a:fld id="{E6607247-EB78-480B-A962-35111A450531}" type="slidenum">
-              <a:rPr kumimoji="0" lang="en-GB" sz="1200" b="0" i="0" u="none" strike="noStrike" kern="1200" cap="none" spc="0" normalizeH="0" baseline="0" noProof="0" smtClean="0">
-                <a:ln>
-                  <a:noFill/>
-                </a:ln>
-                <a:solidFill>
-                  <a:srgbClr val="005EB8"/>
-                </a:solidFill>
-                <a:effectLst/>
-                <a:uLnTx/>
-                <a:uFillTx/>
-                <a:latin typeface="Arial"/>
-                <a:ea typeface="+mn-ea"/>
-                <a:cs typeface="+mn-cs"/>
-              </a:rPr>
-              <a:pPr marL="0" marR="0" lvl="0" indent="0" algn="r" defTabSz="914400" rtl="0" eaLnBrk="1" fontAlgn="auto" latinLnBrk="0" hangingPunct="1">
-                <a:lnSpc>
-                  <a:spcPct val="100000"/>
-                </a:lnSpc>
-                <a:spcBef>
-                  <a:spcPts val="0"/>
-                </a:spcBef>
-                <a:spcAft>
-                  <a:spcPts val="0"/>
-                </a:spcAft>
-                <a:buClrTx/>
-                <a:buSzTx/>
-                <a:buFontTx/>
-                <a:buNone/>
-                <a:tabLst/>
-                <a:defRPr/>
-              </a:pPr>
-              <a:t>22</a:t>
-            </a:fld>
-            <a:endParaRPr kumimoji="0" lang="en-GB" sz="1200" b="0" i="0" u="none" strike="noStrike" kern="1200" cap="none" spc="0" normalizeH="0" baseline="0" noProof="0">
-              <a:ln>
-                <a:noFill/>
-              </a:ln>
-              <a:solidFill>
-                <a:srgbClr val="005EB8"/>
-              </a:solidFill>
-              <a:effectLst/>
-              <a:uLnTx/>
-              <a:uFillTx/>
-              <a:latin typeface="Arial"/>
-              <a:ea typeface="+mn-ea"/>
-              <a:cs typeface="+mn-cs"/>
-            </a:endParaRPr>
-          </a:p>
-        </p:txBody>
-      </p:sp>
-      <p:sp>
-        <p:nvSpPr>
-          <p:cNvPr id="6" name="Text Placeholder 5"/>
-          <p:cNvSpPr>
-            <a:spLocks noGrp="1"/>
-          </p:cNvSpPr>
-          <p:nvPr>
-            <p:ph type="body" sz="quarter" idx="14"/>
-          </p:nvPr>
-        </p:nvSpPr>
-        <p:spPr>
-          <a:xfrm>
-            <a:off x="6858000" y="1"/>
-            <a:ext cx="4339087" cy="5695950"/>
-          </a:xfrm>
-        </p:spPr>
-        <p:txBody>
-          <a:bodyPr/>
-          <a:lstStyle/>
-          <a:p>
-            <a:r>
-              <a:rPr lang="en-GB" dirty="0"/>
-              <a:t>“	Quotation text</a:t>
-            </a:r>
-            <a:br>
-              <a:rPr lang="en-GB" dirty="0"/>
-            </a:br>
-            <a:r>
-              <a:rPr lang="en-GB" dirty="0"/>
-              <a:t>runs here. This is placeholder text, it is here to show how this slide will look when populated with real text.”</a:t>
-            </a:r>
-          </a:p>
-          <a:p>
-            <a:pPr lvl="1"/>
-            <a:r>
-              <a:rPr lang="en-GB" dirty="0"/>
-              <a:t>Name Surname</a:t>
-            </a:r>
-          </a:p>
-          <a:p>
-            <a:pPr lvl="1"/>
-            <a:r>
-              <a:rPr lang="en-GB" dirty="0"/>
-              <a:t>Job title</a:t>
-            </a:r>
-          </a:p>
-        </p:txBody>
-      </p:sp>
-    </p:spTree>
-    <p:extLst>
-      <p:ext uri="{BB962C8B-B14F-4D97-AF65-F5344CB8AC3E}">
-        <p14:creationId xmlns:p14="http://schemas.microsoft.com/office/powerpoint/2010/main" val="2839182919"/>
-      </p:ext>
-    </p:extLst>
-  </p:cSld>
-  <p:clrMapOvr>
-    <a:masterClrMapping/>
-  </p:clrMapOvr>
-  <mc:AlternateContent xmlns:mc="http://schemas.openxmlformats.org/markup-compatibility/2006" xmlns:p14="http://schemas.microsoft.com/office/powerpoint/2010/main">
-    <mc:Choice Requires="p14">
-      <p:transition spd="med" p14:dur="700">
-        <p:fade/>
-      </p:transition>
-    </mc:Choice>
-    <mc:Fallback xmlns="">
-      <p:transition spd="med">
-        <p:fade/>
-      </p:transition>
-    </mc:Fallback>
-  </mc:AlternateContent>
-</p:sld>
-</file>
-
-<file path=ppt/slides/slide23.xml><?xml version="1.0" encoding="utf-8"?>
-<p:sld xmlns:a="http://schemas.openxmlformats.org/drawingml/2006/main" xmlns:r="http://schemas.openxmlformats.org/officeDocument/2006/relationships" xmlns:p="http://schemas.openxmlformats.org/presentationml/2006/main">
-  <p:cSld>
-    <p:spTree>
-      <p:nvGrpSpPr>
-        <p:cNvPr id="1" name=""/>
-        <p:cNvGrpSpPr/>
-        <p:nvPr/>
-      </p:nvGrpSpPr>
-      <p:grpSpPr>
-        <a:xfrm>
-          <a:off x="0" y="0"/>
-          <a:ext cx="0" cy="0"/>
-          <a:chOff x="0" y="0"/>
-          <a:chExt cx="0" cy="0"/>
-        </a:xfrm>
-      </p:grpSpPr>
-      <p:sp>
-        <p:nvSpPr>
-          <p:cNvPr id="5" name="Title 4"/>
-          <p:cNvSpPr>
-            <a:spLocks noGrp="1"/>
-          </p:cNvSpPr>
-          <p:nvPr>
-            <p:ph type="title"/>
-          </p:nvPr>
-        </p:nvSpPr>
-        <p:spPr/>
-        <p:txBody>
-          <a:bodyPr/>
-          <a:lstStyle/>
-          <a:p>
-            <a:r>
-              <a:rPr lang="en-GB" dirty="0"/>
-              <a:t>Icon matrix</a:t>
-            </a:r>
-          </a:p>
-        </p:txBody>
-      </p:sp>
-      <p:sp>
-        <p:nvSpPr>
-          <p:cNvPr id="4" name="Slide Number Placeholder 3"/>
-          <p:cNvSpPr>
-            <a:spLocks noGrp="1"/>
-          </p:cNvSpPr>
-          <p:nvPr>
-            <p:ph type="sldNum" sz="quarter" idx="12"/>
-          </p:nvPr>
-        </p:nvSpPr>
-        <p:spPr/>
-        <p:txBody>
-          <a:bodyPr/>
-          <a:lstStyle/>
-          <a:p>
-            <a:fld id="{E6607247-EB78-480B-A962-35111A450531}" type="slidenum">
-              <a:rPr lang="en-GB" smtClean="0"/>
-              <a:pPr/>
-              <a:t>23</a:t>
-            </a:fld>
-            <a:endParaRPr lang="en-GB"/>
-          </a:p>
-        </p:txBody>
-      </p:sp>
-      <p:sp>
-        <p:nvSpPr>
-          <p:cNvPr id="6" name="Text Placeholder 5"/>
-          <p:cNvSpPr>
-            <a:spLocks noGrp="1"/>
-          </p:cNvSpPr>
-          <p:nvPr>
-            <p:ph type="body" sz="quarter" idx="25"/>
-          </p:nvPr>
-        </p:nvSpPr>
-        <p:spPr/>
-        <p:txBody>
-          <a:bodyPr/>
-          <a:lstStyle/>
-          <a:p>
-            <a:r>
-              <a:rPr lang="en-GB" dirty="0"/>
-              <a:t>Title runs here</a:t>
-            </a:r>
-          </a:p>
-          <a:p>
-            <a:pPr lvl="1"/>
-            <a:r>
-              <a:rPr lang="en-GB" dirty="0"/>
-              <a:t>Description text runs here</a:t>
-            </a:r>
-          </a:p>
-        </p:txBody>
-      </p:sp>
-      <p:pic>
-        <p:nvPicPr>
-          <p:cNvPr id="14" name="Picture Placeholder 13"/>
-          <p:cNvPicPr>
-            <a:picLocks noGrp="1" noChangeAspect="1"/>
-          </p:cNvPicPr>
-          <p:nvPr>
-            <p:ph type="pic" sz="quarter" idx="26"/>
-          </p:nvPr>
-        </p:nvPicPr>
-        <p:blipFill>
-          <a:blip r:embed="rId3"/>
-          <a:srcRect l="41" r="41"/>
-          <a:stretch>
-            <a:fillRect/>
-          </a:stretch>
-        </p:blipFill>
-        <p:spPr>
-          <a:solidFill>
-            <a:schemeClr val="bg1">
-              <a:lumMod val="95000"/>
-            </a:schemeClr>
-          </a:solidFill>
-        </p:spPr>
-      </p:pic>
-      <p:sp>
-        <p:nvSpPr>
-          <p:cNvPr id="8" name="Text Placeholder 7"/>
-          <p:cNvSpPr>
-            <a:spLocks noGrp="1"/>
-          </p:cNvSpPr>
-          <p:nvPr>
-            <p:ph type="body" sz="quarter" idx="27"/>
-          </p:nvPr>
-        </p:nvSpPr>
-        <p:spPr/>
-        <p:txBody>
-          <a:bodyPr/>
-          <a:lstStyle/>
-          <a:p>
-            <a:r>
-              <a:rPr lang="en-GB" dirty="0"/>
-              <a:t>Title runs here</a:t>
-            </a:r>
-          </a:p>
-          <a:p>
-            <a:pPr lvl="1"/>
-            <a:r>
-              <a:rPr lang="en-GB" dirty="0"/>
-              <a:t>Description text runs here</a:t>
-            </a:r>
-          </a:p>
-        </p:txBody>
-      </p:sp>
-      <p:pic>
-        <p:nvPicPr>
-          <p:cNvPr id="9" name="Picture Placeholder 8"/>
-          <p:cNvPicPr>
-            <a:picLocks noGrp="1" noChangeAspect="1"/>
-          </p:cNvPicPr>
-          <p:nvPr>
-            <p:ph type="pic" sz="quarter" idx="28"/>
-          </p:nvPr>
-        </p:nvPicPr>
-        <p:blipFill>
-          <a:blip r:embed="rId4"/>
-          <a:srcRect l="41" r="41"/>
-          <a:stretch>
-            <a:fillRect/>
-          </a:stretch>
-        </p:blipFill>
-        <p:spPr>
-          <a:solidFill>
-            <a:schemeClr val="bg1">
-              <a:lumMod val="95000"/>
-            </a:schemeClr>
-          </a:solidFill>
-        </p:spPr>
-      </p:pic>
-      <p:sp>
-        <p:nvSpPr>
-          <p:cNvPr id="2" name="Text Placeholder 1"/>
-          <p:cNvSpPr>
-            <a:spLocks noGrp="1"/>
-          </p:cNvSpPr>
-          <p:nvPr>
-            <p:ph type="body" sz="quarter" idx="29"/>
-          </p:nvPr>
-        </p:nvSpPr>
-        <p:spPr/>
-        <p:txBody>
-          <a:bodyPr/>
-          <a:lstStyle/>
-          <a:p>
-            <a:r>
-              <a:rPr lang="en-GB" dirty="0"/>
-              <a:t>Title runs here</a:t>
-            </a:r>
-          </a:p>
-          <a:p>
-            <a:pPr lvl="1"/>
-            <a:r>
-              <a:rPr lang="en-GB" dirty="0"/>
-              <a:t>Description text runs here</a:t>
-            </a:r>
-          </a:p>
-        </p:txBody>
-      </p:sp>
-      <p:pic>
-        <p:nvPicPr>
-          <p:cNvPr id="11" name="Picture Placeholder 10"/>
-          <p:cNvPicPr>
-            <a:picLocks noGrp="1" noChangeAspect="1"/>
-          </p:cNvPicPr>
-          <p:nvPr>
-            <p:ph type="pic" sz="quarter" idx="30"/>
-          </p:nvPr>
-        </p:nvPicPr>
-        <p:blipFill>
-          <a:blip r:embed="rId5"/>
-          <a:srcRect/>
-          <a:stretch>
-            <a:fillRect/>
-          </a:stretch>
-        </p:blipFill>
-        <p:spPr>
-          <a:solidFill>
-            <a:schemeClr val="bg1">
-              <a:lumMod val="95000"/>
-            </a:schemeClr>
-          </a:solidFill>
-        </p:spPr>
-      </p:pic>
-      <p:sp>
-        <p:nvSpPr>
-          <p:cNvPr id="13" name="Rectangle 12">
-            <a:extLst>
-              <a:ext uri="{FF2B5EF4-FFF2-40B4-BE49-F238E27FC236}">
-                <a16:creationId xmlns:a16="http://schemas.microsoft.com/office/drawing/2014/main" id="{82D14851-F2F5-9146-95E7-C1B359EED80F}"/>
-              </a:ext>
-            </a:extLst>
-          </p:cNvPr>
-          <p:cNvSpPr/>
-          <p:nvPr/>
-        </p:nvSpPr>
-        <p:spPr>
-          <a:xfrm>
-            <a:off x="3093520" y="367684"/>
-            <a:ext cx="7090385" cy="923330"/>
-          </a:xfrm>
-          <a:prstGeom prst="rect">
-            <a:avLst/>
-          </a:prstGeom>
-        </p:spPr>
-        <p:txBody>
-          <a:bodyPr wrap="square">
-            <a:spAutoFit/>
-          </a:bodyPr>
-          <a:lstStyle/>
-          <a:p>
-            <a:r>
-              <a:rPr lang="en-US" dirty="0">
-                <a:highlight>
-                  <a:srgbClr val="FFFF00"/>
-                </a:highlight>
-              </a:rPr>
-              <a:t>TIP: Access the </a:t>
-            </a:r>
-            <a:r>
-              <a:rPr lang="en-US" dirty="0">
-                <a:solidFill>
-                  <a:schemeClr val="accent1"/>
-                </a:solidFill>
-                <a:highlight>
-                  <a:srgbClr val="FFFF00"/>
-                </a:highlight>
-                <a:hlinkClick r:id="rId6">
-                  <a:extLst>
-                    <a:ext uri="{A12FA001-AC4F-418D-AE19-62706E023703}">
-                      <ahyp:hlinkClr xmlns:ahyp="http://schemas.microsoft.com/office/drawing/2018/hyperlinkcolor" val="tx"/>
-                    </a:ext>
-                  </a:extLst>
-                </a:hlinkClick>
-              </a:rPr>
-              <a:t>corporate icon library </a:t>
-            </a:r>
-            <a:r>
-              <a:rPr lang="en-US" dirty="0">
-                <a:highlight>
-                  <a:srgbClr val="FFFF00"/>
-                </a:highlight>
-              </a:rPr>
-              <a:t>to search and download icons. To replace one of the icons here, right-click ‘Change picture’ then point to the icon file you have downloaded.</a:t>
-            </a:r>
-          </a:p>
-        </p:txBody>
-      </p:sp>
-    </p:spTree>
-    <p:extLst>
-      <p:ext uri="{BB962C8B-B14F-4D97-AF65-F5344CB8AC3E}">
-        <p14:creationId xmlns:p14="http://schemas.microsoft.com/office/powerpoint/2010/main" val="2338655525"/>
-      </p:ext>
-    </p:extLst>
-  </p:cSld>
-  <p:clrMapOvr>
-    <a:masterClrMapping/>
-  </p:clrMapOvr>
-  <mc:AlternateContent xmlns:mc="http://schemas.openxmlformats.org/markup-compatibility/2006" xmlns:p14="http://schemas.microsoft.com/office/powerpoint/2010/main">
-    <mc:Choice Requires="p14">
-      <p:transition spd="med" p14:dur="700">
-        <p:fade/>
-      </p:transition>
-    </mc:Choice>
-    <mc:Fallback xmlns="">
-      <p:transition spd="med">
-        <p:fade/>
-      </p:transition>
-    </mc:Fallback>
-  </mc:AlternateContent>
-</p:sld>
-</file>
-
-<file path=ppt/slides/slide24.xml><?xml version="1.0" encoding="utf-8"?>
-<p:sld xmlns:a="http://schemas.openxmlformats.org/drawingml/2006/main" xmlns:r="http://schemas.openxmlformats.org/officeDocument/2006/relationships" xmlns:p="http://schemas.openxmlformats.org/presentationml/2006/main">
-  <p:cSld>
-    <p:spTree>
-      <p:nvGrpSpPr>
-        <p:cNvPr id="1" name=""/>
-        <p:cNvGrpSpPr/>
-        <p:nvPr/>
-      </p:nvGrpSpPr>
-      <p:grpSpPr>
-        <a:xfrm>
-          <a:off x="0" y="0"/>
-          <a:ext cx="0" cy="0"/>
-          <a:chOff x="0" y="0"/>
-          <a:chExt cx="0" cy="0"/>
-        </a:xfrm>
-      </p:grpSpPr>
-      <p:sp>
-        <p:nvSpPr>
-          <p:cNvPr id="2" name="Title 1"/>
-          <p:cNvSpPr>
-            <a:spLocks noGrp="1"/>
-          </p:cNvSpPr>
-          <p:nvPr>
-            <p:ph type="title"/>
-          </p:nvPr>
-        </p:nvSpPr>
-        <p:spPr/>
-        <p:txBody>
-          <a:bodyPr/>
-          <a:lstStyle/>
-          <a:p>
-            <a:r>
-              <a:rPr lang="en-GB" dirty="0"/>
-              <a:t>Slide title runs here</a:t>
-            </a:r>
-          </a:p>
-        </p:txBody>
-      </p:sp>
-      <p:sp>
-        <p:nvSpPr>
-          <p:cNvPr id="4" name="Content Placeholder 3"/>
-          <p:cNvSpPr>
-            <a:spLocks noGrp="1"/>
-          </p:cNvSpPr>
-          <p:nvPr>
-            <p:ph idx="1"/>
-          </p:nvPr>
-        </p:nvSpPr>
-        <p:spPr/>
-        <p:txBody>
-          <a:bodyPr>
-            <a:normAutofit/>
-          </a:bodyPr>
-          <a:lstStyle/>
-          <a:p>
-            <a:r>
-              <a:rPr lang="en-GB" sz="2400" dirty="0"/>
-              <a:t>this is bulleted text</a:t>
-            </a:r>
-          </a:p>
-          <a:p>
-            <a:r>
-              <a:rPr lang="en-GB" sz="2400" dirty="0"/>
-              <a:t>bulleted text runs here</a:t>
-            </a:r>
-          </a:p>
-          <a:p>
-            <a:r>
-              <a:rPr lang="en-GB" sz="2400" dirty="0"/>
-              <a:t>this is bulleted text</a:t>
-            </a:r>
-          </a:p>
-          <a:p>
-            <a:r>
-              <a:rPr lang="en-GB" sz="2400" dirty="0"/>
-              <a:t>bulleted text runs here</a:t>
-            </a:r>
-          </a:p>
-          <a:p>
-            <a:pPr marL="0" indent="0">
-              <a:buNone/>
-            </a:pPr>
-            <a:endParaRPr lang="en-GB" sz="2400" dirty="0"/>
-          </a:p>
-        </p:txBody>
-      </p:sp>
-      <p:sp>
-        <p:nvSpPr>
-          <p:cNvPr id="3" name="Slide Number Placeholder 2"/>
-          <p:cNvSpPr>
-            <a:spLocks noGrp="1"/>
-          </p:cNvSpPr>
-          <p:nvPr>
-            <p:ph type="sldNum" sz="quarter" idx="12"/>
-          </p:nvPr>
-        </p:nvSpPr>
-        <p:spPr/>
-        <p:txBody>
-          <a:bodyPr/>
-          <a:lstStyle/>
-          <a:p>
-            <a:fld id="{E6607247-EB78-480B-A962-35111A450531}" type="slidenum">
-              <a:rPr lang="en-GB" smtClean="0"/>
-              <a:t>24</a:t>
-            </a:fld>
-            <a:endParaRPr lang="en-GB"/>
-          </a:p>
-        </p:txBody>
-      </p:sp>
-    </p:spTree>
-    <p:extLst>
-      <p:ext uri="{BB962C8B-B14F-4D97-AF65-F5344CB8AC3E}">
-        <p14:creationId xmlns:p14="http://schemas.microsoft.com/office/powerpoint/2010/main" val="211329417"/>
-      </p:ext>
-    </p:extLst>
-  </p:cSld>
-  <p:clrMapOvr>
-    <a:masterClrMapping/>
-  </p:clrMapOvr>
-  <mc:AlternateContent xmlns:mc="http://schemas.openxmlformats.org/markup-compatibility/2006" xmlns:p14="http://schemas.microsoft.com/office/powerpoint/2010/main">
-    <mc:Choice Requires="p14">
-      <p:transition spd="med" p14:dur="700">
-        <p:fade/>
-      </p:transition>
-    </mc:Choice>
-    <mc:Fallback xmlns="">
-      <p:transition spd="med">
-        <p:fade/>
-      </p:transition>
-    </mc:Fallback>
-  </mc:AlternateContent>
-</p:sld>
-</file>
-
-<file path=ppt/slides/slide25.xml><?xml version="1.0" encoding="utf-8"?>
-<p:sld xmlns:a="http://schemas.openxmlformats.org/drawingml/2006/main" xmlns:r="http://schemas.openxmlformats.org/officeDocument/2006/relationships" xmlns:p="http://schemas.openxmlformats.org/presentationml/2006/main">
-  <p:cSld>
-    <p:spTree>
-      <p:nvGrpSpPr>
-        <p:cNvPr id="1" name=""/>
-        <p:cNvGrpSpPr/>
-        <p:nvPr/>
-      </p:nvGrpSpPr>
-      <p:grpSpPr>
-        <a:xfrm>
-          <a:off x="0" y="0"/>
-          <a:ext cx="0" cy="0"/>
-          <a:chOff x="0" y="0"/>
-          <a:chExt cx="0" cy="0"/>
-        </a:xfrm>
-      </p:grpSpPr>
-      <p:sp>
-        <p:nvSpPr>
-          <p:cNvPr id="4" name="Slide Number Placeholder 3"/>
-          <p:cNvSpPr>
-            <a:spLocks noGrp="1"/>
-          </p:cNvSpPr>
-          <p:nvPr>
-            <p:ph type="sldNum" sz="quarter" idx="12"/>
-          </p:nvPr>
-        </p:nvSpPr>
-        <p:spPr/>
-        <p:txBody>
-          <a:bodyPr/>
-          <a:lstStyle/>
-          <a:p>
-            <a:fld id="{E6607247-EB78-480B-A962-35111A450531}" type="slidenum">
-              <a:rPr lang="en-GB" smtClean="0"/>
-              <a:t>25</a:t>
-            </a:fld>
-            <a:endParaRPr lang="en-GB"/>
-          </a:p>
-        </p:txBody>
-      </p:sp>
-    </p:spTree>
-    <p:extLst>
-      <p:ext uri="{BB962C8B-B14F-4D97-AF65-F5344CB8AC3E}">
-        <p14:creationId xmlns:p14="http://schemas.microsoft.com/office/powerpoint/2010/main" val="3622467584"/>
       </p:ext>
     </p:extLst>
   </p:cSld>

</xml_diff>